<commit_message>
Site updated: 2019-03-19 08:36:21
</commit_message>
<xml_diff>
--- a/document/ppt/20180905AIWAC宝宝机器人.pptx
+++ b/document/ppt/20180905AIWAC宝宝机器人.pptx
@@ -8322,7 +8322,7 @@
           <a:lstStyle/>
           <a:p>
             <a:r>
-              <a:rPr lang="en-US" altLang="zh-CN" sz="2000" b="1" dirty="0">
+              <a:rPr lang="zh-CN" altLang="en-US" sz="2000" b="1" dirty="0">
                 <a:solidFill>
                   <a:srgbClr val="434343"/>
                 </a:solidFill>
@@ -8336,7 +8336,7 @@
                 <a:latin typeface="Times New Roman" pitchFamily="18" charset="0"/>
                 <a:cs typeface="Times New Roman" pitchFamily="18" charset="0"/>
               </a:rPr>
-              <a:t>AIWAC1.0  Design</a:t>
+              <a:t>实验平台</a:t>
             </a:r>
           </a:p>
         </p:txBody>

</xml_diff>